<commit_message>
Prezentacijas mainigo informacijas pievienosana
</commit_message>
<xml_diff>
--- a/Bumerts_InformativaisMaterials.pptx
+++ b/Bumerts_InformativaisMaterials.pptx
@@ -110,6 +110,11 @@
       </a:defRPr>
     </a:lvl9pPr>
   </p:defaultTextStyle>
+  <p:extLst>
+    <p:ext uri="{EFAFB233-063F-42B5-8137-9DF3F51BA10A}">
+      <p15:sldGuideLst xmlns:p15="http://schemas.microsoft.com/office/powerpoint/2012/main"/>
+    </p:ext>
+  </p:extLst>
 </p:presentation>
 </file>
 
@@ -262,7 +267,7 @@
           <a:p>
             <a:fld id="{EFCC5841-8728-46E2-B4B4-E3ECA7988A69}" type="datetimeFigureOut">
               <a:rPr lang="en-GB" smtClean="0"/>
-              <a:t>02/06/2023</a:t>
+              <a:t>06/06/2023</a:t>
             </a:fld>
             <a:endParaRPr lang="en-GB"/>
           </a:p>
@@ -462,7 +467,7 @@
           <a:p>
             <a:fld id="{EFCC5841-8728-46E2-B4B4-E3ECA7988A69}" type="datetimeFigureOut">
               <a:rPr lang="en-GB" smtClean="0"/>
-              <a:t>02/06/2023</a:t>
+              <a:t>06/06/2023</a:t>
             </a:fld>
             <a:endParaRPr lang="en-GB"/>
           </a:p>
@@ -672,7 +677,7 @@
           <a:p>
             <a:fld id="{EFCC5841-8728-46E2-B4B4-E3ECA7988A69}" type="datetimeFigureOut">
               <a:rPr lang="en-GB" smtClean="0"/>
-              <a:t>02/06/2023</a:t>
+              <a:t>06/06/2023</a:t>
             </a:fld>
             <a:endParaRPr lang="en-GB"/>
           </a:p>
@@ -872,7 +877,7 @@
           <a:p>
             <a:fld id="{EFCC5841-8728-46E2-B4B4-E3ECA7988A69}" type="datetimeFigureOut">
               <a:rPr lang="en-GB" smtClean="0"/>
-              <a:t>02/06/2023</a:t>
+              <a:t>06/06/2023</a:t>
             </a:fld>
             <a:endParaRPr lang="en-GB"/>
           </a:p>
@@ -1148,7 +1153,7 @@
           <a:p>
             <a:fld id="{EFCC5841-8728-46E2-B4B4-E3ECA7988A69}" type="datetimeFigureOut">
               <a:rPr lang="en-GB" smtClean="0"/>
-              <a:t>02/06/2023</a:t>
+              <a:t>06/06/2023</a:t>
             </a:fld>
             <a:endParaRPr lang="en-GB"/>
           </a:p>
@@ -1416,7 +1421,7 @@
           <a:p>
             <a:fld id="{EFCC5841-8728-46E2-B4B4-E3ECA7988A69}" type="datetimeFigureOut">
               <a:rPr lang="en-GB" smtClean="0"/>
-              <a:t>02/06/2023</a:t>
+              <a:t>06/06/2023</a:t>
             </a:fld>
             <a:endParaRPr lang="en-GB"/>
           </a:p>
@@ -1831,7 +1836,7 @@
           <a:p>
             <a:fld id="{EFCC5841-8728-46E2-B4B4-E3ECA7988A69}" type="datetimeFigureOut">
               <a:rPr lang="en-GB" smtClean="0"/>
-              <a:t>02/06/2023</a:t>
+              <a:t>06/06/2023</a:t>
             </a:fld>
             <a:endParaRPr lang="en-GB"/>
           </a:p>
@@ -1973,7 +1978,7 @@
           <a:p>
             <a:fld id="{EFCC5841-8728-46E2-B4B4-E3ECA7988A69}" type="datetimeFigureOut">
               <a:rPr lang="en-GB" smtClean="0"/>
-              <a:t>02/06/2023</a:t>
+              <a:t>06/06/2023</a:t>
             </a:fld>
             <a:endParaRPr lang="en-GB"/>
           </a:p>
@@ -2086,7 +2091,7 @@
           <a:p>
             <a:fld id="{EFCC5841-8728-46E2-B4B4-E3ECA7988A69}" type="datetimeFigureOut">
               <a:rPr lang="en-GB" smtClean="0"/>
-              <a:t>02/06/2023</a:t>
+              <a:t>06/06/2023</a:t>
             </a:fld>
             <a:endParaRPr lang="en-GB"/>
           </a:p>
@@ -2399,7 +2404,7 @@
           <a:p>
             <a:fld id="{EFCC5841-8728-46E2-B4B4-E3ECA7988A69}" type="datetimeFigureOut">
               <a:rPr lang="en-GB" smtClean="0"/>
-              <a:t>02/06/2023</a:t>
+              <a:t>06/06/2023</a:t>
             </a:fld>
             <a:endParaRPr lang="en-GB"/>
           </a:p>
@@ -2688,7 +2693,7 @@
           <a:p>
             <a:fld id="{EFCC5841-8728-46E2-B4B4-E3ECA7988A69}" type="datetimeFigureOut">
               <a:rPr lang="en-GB" smtClean="0"/>
-              <a:t>02/06/2023</a:t>
+              <a:t>06/06/2023</a:t>
             </a:fld>
             <a:endParaRPr lang="en-GB"/>
           </a:p>
@@ -2931,7 +2936,7 @@
           <a:p>
             <a:fld id="{EFCC5841-8728-46E2-B4B4-E3ECA7988A69}" type="datetimeFigureOut">
               <a:rPr lang="en-GB" smtClean="0"/>
-              <a:t>02/06/2023</a:t>
+              <a:t>06/06/2023</a:t>
             </a:fld>
             <a:endParaRPr lang="en-GB"/>
           </a:p>
@@ -3488,12 +3493,27 @@
             <p:ph idx="1"/>
           </p:nvPr>
         </p:nvSpPr>
-        <p:spPr/>
-        <p:txBody>
-          <a:bodyPr/>
-          <a:lstStyle/>
-          <a:p>
-            <a:endParaRPr lang="en-GB"/>
+        <p:spPr>
+          <a:xfrm>
+            <a:off x="838200" y="1825625"/>
+            <a:ext cx="4732283" cy="3692306"/>
+          </a:xfrm>
+        </p:spPr>
+        <p:txBody>
+          <a:bodyPr/>
+          <a:lstStyle/>
+          <a:p>
+            <a:pPr marL="0" indent="0">
+              <a:buNone/>
+            </a:pPr>
+            <a:r>
+              <a:rPr lang="lv-LV" b="0" i="0" dirty="0">
+                <a:effectLst/>
+                <a:latin typeface="Söhne"/>
+              </a:rPr>
+              <a:t>Int mainīgais,tiek izmantots, lai uzglabātu veselus skaitļus, piemēram, 1, 2, 100 utt.</a:t>
+            </a:r>
+            <a:endParaRPr lang="en-GB" dirty="0"/>
           </a:p>
         </p:txBody>
       </p:sp>
@@ -3572,12 +3592,23 @@
             <p:ph idx="1"/>
           </p:nvPr>
         </p:nvSpPr>
-        <p:spPr/>
-        <p:txBody>
-          <a:bodyPr/>
-          <a:lstStyle/>
-          <a:p>
-            <a:endParaRPr lang="en-GB"/>
+        <p:spPr>
+          <a:xfrm>
+            <a:off x="838200" y="1825625"/>
+            <a:ext cx="4059621" cy="4270375"/>
+          </a:xfrm>
+        </p:spPr>
+        <p:txBody>
+          <a:bodyPr/>
+          <a:lstStyle/>
+          <a:p>
+            <a:pPr marL="0" indent="0">
+              <a:buNone/>
+            </a:pPr>
+            <a:r>
+              <a:rPr lang="lv-LV" dirty="0"/>
+              <a:t>Realie skaitļi tiek izmantoti lai saglabātu skaitļus mainīga kurš sastāv no decimāldaļām(aiz komata).</a:t>
+            </a:r>
           </a:p>
         </p:txBody>
       </p:sp>
@@ -3656,12 +3687,24 @@
             <p:ph idx="1"/>
           </p:nvPr>
         </p:nvSpPr>
-        <p:spPr/>
-        <p:txBody>
-          <a:bodyPr/>
-          <a:lstStyle/>
-          <a:p>
-            <a:endParaRPr lang="en-GB"/>
+        <p:spPr>
+          <a:xfrm>
+            <a:off x="838200" y="1825625"/>
+            <a:ext cx="5110655" cy="4175782"/>
+          </a:xfrm>
+        </p:spPr>
+        <p:txBody>
+          <a:bodyPr/>
+          <a:lstStyle/>
+          <a:p>
+            <a:pPr marL="0" indent="0">
+              <a:buNone/>
+            </a:pPr>
+            <a:r>
+              <a:rPr lang="lv-LV" dirty="0"/>
+              <a:t>Mainīgais tiek izmantots programmēšanā,lai saglabātu loģiskas vērtības. Mainīgais var pieņemt divas iespējamas vērtības: «patiesi»,»aplami».</a:t>
+            </a:r>
+            <a:endParaRPr lang="en-GB" dirty="0"/>
           </a:p>
         </p:txBody>
       </p:sp>
@@ -3740,12 +3783,24 @@
             <p:ph idx="1"/>
           </p:nvPr>
         </p:nvSpPr>
-        <p:spPr/>
-        <p:txBody>
-          <a:bodyPr/>
-          <a:lstStyle/>
-          <a:p>
-            <a:endParaRPr lang="en-GB"/>
+        <p:spPr>
+          <a:xfrm>
+            <a:off x="838200" y="1825625"/>
+            <a:ext cx="3628697" cy="4351338"/>
+          </a:xfrm>
+        </p:spPr>
+        <p:txBody>
+          <a:bodyPr/>
+          <a:lstStyle/>
+          <a:p>
+            <a:pPr marL="0" indent="0">
+              <a:buNone/>
+            </a:pPr>
+            <a:r>
+              <a:rPr lang="lv-LV" dirty="0"/>
+              <a:t>Mainīgais tiek izmantots, lai glabātu vienu rakstzīmi vai simbolu.</a:t>
+            </a:r>
+            <a:endParaRPr lang="en-GB" dirty="0"/>
           </a:p>
         </p:txBody>
       </p:sp>
@@ -3824,12 +3879,24 @@
             <p:ph idx="1"/>
           </p:nvPr>
         </p:nvSpPr>
-        <p:spPr/>
-        <p:txBody>
-          <a:bodyPr/>
-          <a:lstStyle/>
-          <a:p>
-            <a:endParaRPr lang="en-GB"/>
+        <p:spPr>
+          <a:xfrm>
+            <a:off x="838200" y="1825625"/>
+            <a:ext cx="3817883" cy="4351338"/>
+          </a:xfrm>
+        </p:spPr>
+        <p:txBody>
+          <a:bodyPr/>
+          <a:lstStyle/>
+          <a:p>
+            <a:pPr marL="0" indent="0">
+              <a:buNone/>
+            </a:pPr>
+            <a:r>
+              <a:rPr lang="lv-LV" dirty="0"/>
+              <a:t>Mainīgais tiek izmantots, lai glabātu un apstrādātu teksta rindas vai simbolu virknes.</a:t>
+            </a:r>
+            <a:endParaRPr lang="en-GB" dirty="0"/>
           </a:p>
         </p:txBody>
       </p:sp>
@@ -3908,12 +3975,24 @@
             <p:ph idx="1"/>
           </p:nvPr>
         </p:nvSpPr>
-        <p:spPr/>
-        <p:txBody>
-          <a:bodyPr/>
-          <a:lstStyle/>
-          <a:p>
-            <a:endParaRPr lang="en-GB"/>
+        <p:spPr>
+          <a:xfrm>
+            <a:off x="838200" y="1825625"/>
+            <a:ext cx="3302876" cy="4351338"/>
+          </a:xfrm>
+        </p:spPr>
+        <p:txBody>
+          <a:bodyPr/>
+          <a:lstStyle/>
+          <a:p>
+            <a:pPr marL="0" indent="0">
+              <a:buNone/>
+            </a:pPr>
+            <a:r>
+              <a:rPr lang="lv-LV" dirty="0"/>
+              <a:t>Mainīgais ļauj glabāt vairākus elementus vienā mainīgajā.</a:t>
+            </a:r>
+            <a:endParaRPr lang="en-GB" dirty="0"/>
           </a:p>
         </p:txBody>
       </p:sp>

</xml_diff>

<commit_message>
Daleja kodu fragmenta pievienosana
</commit_message>
<xml_diff>
--- a/Bumerts_InformativaisMaterials.pptx
+++ b/Bumerts_InformativaisMaterials.pptx
@@ -3471,7 +3471,19 @@
           <a:p>
             <a:r>
               <a:rPr lang="lv-LV" dirty="0"/>
-              <a:t>Veseli skaitļi(int)</a:t>
+              <a:t>Veseli skaitļi(</a:t>
+            </a:r>
+            <a:r>
+              <a:rPr lang="lv-LV" dirty="0">
+                <a:solidFill>
+                  <a:srgbClr val="7030A0"/>
+                </a:solidFill>
+              </a:rPr>
+              <a:t>int</a:t>
+            </a:r>
+            <a:r>
+              <a:rPr lang="lv-LV" dirty="0"/>
+              <a:t>)</a:t>
             </a:r>
             <a:endParaRPr lang="en-GB" dirty="0"/>
           </a:p>
@@ -3507,16 +3519,198 @@
               <a:buNone/>
             </a:pPr>
             <a:r>
+              <a:rPr lang="lv-LV" dirty="0">
+                <a:solidFill>
+                  <a:srgbClr val="7030A0"/>
+                </a:solidFill>
+                <a:latin typeface="Söhne"/>
+              </a:rPr>
+              <a:t>i</a:t>
+            </a:r>
+            <a:r>
+              <a:rPr lang="lv-LV" b="0" i="0" dirty="0">
+                <a:solidFill>
+                  <a:srgbClr val="7030A0"/>
+                </a:solidFill>
+                <a:effectLst/>
+                <a:latin typeface="Söhne"/>
+              </a:rPr>
+              <a:t>nt</a:t>
+            </a:r>
+            <a:r>
               <a:rPr lang="lv-LV" b="0" i="0" dirty="0">
                 <a:effectLst/>
                 <a:latin typeface="Söhne"/>
               </a:rPr>
-              <a:t>Int mainīgais,tiek izmantots, lai uzglabātu veselus skaitļus, piemēram, 1, 2, 100 utt.</a:t>
+              <a:t> mainīgais,tiek izmantots, lai uzglabātu veselus skaitļus, piemēram, 1, 2, 100 utt.</a:t>
+            </a:r>
+          </a:p>
+          <a:p>
+            <a:pPr marL="0" indent="0">
+              <a:buNone/>
+            </a:pPr>
+            <a:r>
+              <a:rPr lang="lv-LV" dirty="0">
+                <a:latin typeface="Söhne"/>
+              </a:rPr>
+              <a:t>Ta arī tiek izmantota kā vertība ar kuru nosaka cik ilgi cikls veiks savu darbību.</a:t>
             </a:r>
             <a:endParaRPr lang="en-GB" dirty="0"/>
           </a:p>
         </p:txBody>
       </p:sp>
+      <p:sp>
+        <p:nvSpPr>
+          <p:cNvPr id="6" name="TextBox 5">
+            <a:extLst>
+              <a:ext uri="{FF2B5EF4-FFF2-40B4-BE49-F238E27FC236}">
+                <a16:creationId xmlns:a16="http://schemas.microsoft.com/office/drawing/2014/main" id="{FC792F4C-F02F-0FE7-C4D9-F761EB02D6C9}"/>
+              </a:ext>
+            </a:extLst>
+          </p:cNvPr>
+          <p:cNvSpPr txBox="1"/>
+          <p:nvPr/>
+        </p:nvSpPr>
+        <p:spPr>
+          <a:xfrm>
+            <a:off x="6368157" y="3531389"/>
+            <a:ext cx="4985643" cy="1900007"/>
+          </a:xfrm>
+          <a:prstGeom prst="rect">
+            <a:avLst/>
+          </a:prstGeom>
+          <a:noFill/>
+        </p:spPr>
+        <p:txBody>
+          <a:bodyPr wrap="square" rtlCol="0">
+            <a:spAutoFit/>
+          </a:bodyPr>
+          <a:lstStyle/>
+          <a:p>
+            <a:pPr>
+              <a:lnSpc>
+                <a:spcPct val="90000"/>
+              </a:lnSpc>
+              <a:spcBef>
+                <a:spcPts val="1000"/>
+              </a:spcBef>
+            </a:pPr>
+            <a:r>
+              <a:rPr lang="lv-LV" sz="2800" dirty="0">
+                <a:latin typeface="Söhne"/>
+              </a:rPr>
+              <a:t>Maksimāla </a:t>
+            </a:r>
+            <a:r>
+              <a:rPr lang="lv-LV" sz="2800" dirty="0">
+                <a:solidFill>
+                  <a:srgbClr val="7030A0"/>
+                </a:solidFill>
+                <a:latin typeface="Söhne"/>
+              </a:rPr>
+              <a:t>int</a:t>
+            </a:r>
+            <a:r>
+              <a:rPr lang="lv-LV" sz="2800" dirty="0">
+                <a:latin typeface="Söhne"/>
+              </a:rPr>
+              <a:t> vērtība: </a:t>
+            </a:r>
+            <a:r>
+              <a:rPr lang="en-GB" sz="2800" dirty="0">
+                <a:latin typeface="Söhne"/>
+              </a:rPr>
+              <a:t>2147483647</a:t>
+            </a:r>
+            <a:endParaRPr lang="lv-LV" sz="2800" dirty="0">
+              <a:latin typeface="Söhne"/>
+            </a:endParaRPr>
+          </a:p>
+          <a:p>
+            <a:pPr>
+              <a:lnSpc>
+                <a:spcPct val="90000"/>
+              </a:lnSpc>
+              <a:spcBef>
+                <a:spcPts val="1000"/>
+              </a:spcBef>
+            </a:pPr>
+            <a:r>
+              <a:rPr lang="lv-LV" sz="2800" dirty="0">
+                <a:latin typeface="Söhne"/>
+              </a:rPr>
+              <a:t>Mazākā </a:t>
+            </a:r>
+            <a:r>
+              <a:rPr lang="lv-LV" sz="2800" dirty="0">
+                <a:solidFill>
+                  <a:srgbClr val="7030A0"/>
+                </a:solidFill>
+                <a:latin typeface="Söhne"/>
+              </a:rPr>
+              <a:t>int</a:t>
+            </a:r>
+            <a:r>
+              <a:rPr lang="lv-LV" sz="2800" dirty="0">
+                <a:latin typeface="Söhne"/>
+              </a:rPr>
+              <a:t> mainīga vērtība: </a:t>
+            </a:r>
+          </a:p>
+          <a:p>
+            <a:pPr>
+              <a:lnSpc>
+                <a:spcPct val="90000"/>
+              </a:lnSpc>
+              <a:spcBef>
+                <a:spcPts val="1000"/>
+              </a:spcBef>
+            </a:pPr>
+            <a:r>
+              <a:rPr lang="lv-LV" sz="2800" dirty="0">
+                <a:latin typeface="Söhne"/>
+              </a:rPr>
+              <a:t>-</a:t>
+            </a:r>
+            <a:r>
+              <a:rPr lang="en-GB" sz="2800" dirty="0">
+                <a:latin typeface="Söhne"/>
+              </a:rPr>
+              <a:t>2147483647</a:t>
+            </a:r>
+          </a:p>
+        </p:txBody>
+      </p:sp>
+      <p:pic>
+        <p:nvPicPr>
+          <p:cNvPr id="11" name="Picture 10">
+            <a:extLst>
+              <a:ext uri="{FF2B5EF4-FFF2-40B4-BE49-F238E27FC236}">
+                <a16:creationId xmlns:a16="http://schemas.microsoft.com/office/drawing/2014/main" id="{1403D37E-B050-E185-A84D-E97CA032EC31}"/>
+              </a:ext>
+            </a:extLst>
+          </p:cNvPr>
+          <p:cNvPicPr>
+            <a:picLocks noChangeAspect="1"/>
+          </p:cNvPicPr>
+          <p:nvPr/>
+        </p:nvPicPr>
+        <p:blipFill>
+          <a:blip r:embed="rId2"/>
+          <a:stretch>
+            <a:fillRect/>
+          </a:stretch>
+        </p:blipFill>
+        <p:spPr>
+          <a:xfrm>
+            <a:off x="6391275" y="592937"/>
+            <a:ext cx="4962525" cy="2733675"/>
+          </a:xfrm>
+          <a:prstGeom prst="rect">
+            <a:avLst/>
+          </a:prstGeom>
+        </p:spPr>
+      </p:pic>
     </p:spTree>
     <p:extLst>
       <p:ext uri="{BB962C8B-B14F-4D97-AF65-F5344CB8AC3E}">
@@ -3570,7 +3764,19 @@
           <a:p>
             <a:r>
               <a:rPr lang="lv-LV" dirty="0"/>
-              <a:t>Reālie skaitļi(double)</a:t>
+              <a:t>Reālie skaitļi(</a:t>
+            </a:r>
+            <a:r>
+              <a:rPr lang="lv-LV" dirty="0">
+                <a:solidFill>
+                  <a:srgbClr val="7030A0"/>
+                </a:solidFill>
+              </a:rPr>
+              <a:t>double</a:t>
+            </a:r>
+            <a:r>
+              <a:rPr lang="lv-LV" dirty="0"/>
+              <a:t>)</a:t>
             </a:r>
             <a:endParaRPr lang="en-GB" dirty="0"/>
           </a:p>
@@ -3612,6 +3818,36 @@
           </a:p>
         </p:txBody>
       </p:sp>
+      <p:pic>
+        <p:nvPicPr>
+          <p:cNvPr id="6" name="Picture 5">
+            <a:extLst>
+              <a:ext uri="{FF2B5EF4-FFF2-40B4-BE49-F238E27FC236}">
+                <a16:creationId xmlns:a16="http://schemas.microsoft.com/office/drawing/2014/main" id="{8A1D9351-1E6A-C94F-AB77-4D7B9F04060B}"/>
+              </a:ext>
+            </a:extLst>
+          </p:cNvPr>
+          <p:cNvPicPr>
+            <a:picLocks noChangeAspect="1"/>
+          </p:cNvPicPr>
+          <p:nvPr/>
+        </p:nvPicPr>
+        <p:blipFill>
+          <a:blip r:embed="rId2"/>
+          <a:stretch>
+            <a:fillRect/>
+          </a:stretch>
+        </p:blipFill>
+        <p:spPr>
+          <a:xfrm>
+            <a:off x="5886871" y="2060445"/>
+            <a:ext cx="6034542" cy="3027784"/>
+          </a:xfrm>
+          <a:prstGeom prst="rect">
+            <a:avLst/>
+          </a:prstGeom>
+        </p:spPr>
+      </p:pic>
     </p:spTree>
     <p:extLst>
       <p:ext uri="{BB962C8B-B14F-4D97-AF65-F5344CB8AC3E}">
@@ -3665,7 +3901,19 @@
           <a:p>
             <a:r>
               <a:rPr lang="lv-LV" dirty="0"/>
-              <a:t>Būla vērtības(boolean)</a:t>
+              <a:t>Būla vērtības(</a:t>
+            </a:r>
+            <a:r>
+              <a:rPr lang="lv-LV" dirty="0">
+                <a:solidFill>
+                  <a:srgbClr val="7030A0"/>
+                </a:solidFill>
+              </a:rPr>
+              <a:t>boolean</a:t>
+            </a:r>
+            <a:r>
+              <a:rPr lang="lv-LV" dirty="0"/>
+              <a:t>)</a:t>
             </a:r>
             <a:endParaRPr lang="en-GB" dirty="0"/>
           </a:p>
@@ -3689,7 +3937,7 @@
         </p:nvSpPr>
         <p:spPr>
           <a:xfrm>
-            <a:off x="838200" y="1825625"/>
+            <a:off x="613610" y="1889793"/>
             <a:ext cx="5110655" cy="4175782"/>
           </a:xfrm>
         </p:spPr>
@@ -3702,12 +3950,51 @@
             </a:pPr>
             <a:r>
               <a:rPr lang="lv-LV" dirty="0"/>
-              <a:t>Mainīgais tiek izmantots programmēšanā,lai saglabātu loģiskas vērtības. Mainīgais var pieņemt divas iespējamas vērtības: «patiesi»,»aplami».</a:t>
+              <a:t>Mainīgais tiek izmantots programmēšanā,lai saglabātu loģiskas vērtības. Mainīgais var pieņemt divas iespējamas vērtības:</a:t>
+            </a:r>
+          </a:p>
+          <a:p>
+            <a:pPr marL="0" indent="0">
+              <a:buNone/>
+            </a:pPr>
+            <a:r>
+              <a:rPr lang="lv-LV" dirty="0"/>
+              <a:t>«patiesi»(true),»aplami»(false).</a:t>
             </a:r>
             <a:endParaRPr lang="en-GB" dirty="0"/>
           </a:p>
         </p:txBody>
       </p:sp>
+      <p:pic>
+        <p:nvPicPr>
+          <p:cNvPr id="5" name="Picture 4">
+            <a:extLst>
+              <a:ext uri="{FF2B5EF4-FFF2-40B4-BE49-F238E27FC236}">
+                <a16:creationId xmlns:a16="http://schemas.microsoft.com/office/drawing/2014/main" id="{033B3AE3-06BC-74E7-5D6F-ABC7E25121F9}"/>
+              </a:ext>
+            </a:extLst>
+          </p:cNvPr>
+          <p:cNvPicPr>
+            <a:picLocks noChangeAspect="1"/>
+          </p:cNvPicPr>
+          <p:nvPr/>
+        </p:nvPicPr>
+        <p:blipFill>
+          <a:blip r:embed="rId2"/>
+          <a:stretch>
+            <a:fillRect/>
+          </a:stretch>
+        </p:blipFill>
+        <p:spPr>
+          <a:xfrm>
+            <a:off x="5427916" y="2035175"/>
+            <a:ext cx="6657975" cy="4457700"/>
+          </a:xfrm>
+          <a:prstGeom prst="rect">
+            <a:avLst/>
+          </a:prstGeom>
+        </p:spPr>
+      </p:pic>
     </p:spTree>
     <p:extLst>
       <p:ext uri="{BB962C8B-B14F-4D97-AF65-F5344CB8AC3E}">
@@ -3804,6 +4091,36 @@
           </a:p>
         </p:txBody>
       </p:sp>
+      <p:pic>
+        <p:nvPicPr>
+          <p:cNvPr id="5" name="Picture 4">
+            <a:extLst>
+              <a:ext uri="{FF2B5EF4-FFF2-40B4-BE49-F238E27FC236}">
+                <a16:creationId xmlns:a16="http://schemas.microsoft.com/office/drawing/2014/main" id="{C3820158-441A-513C-FE4E-9ABA0CD0CCD7}"/>
+              </a:ext>
+            </a:extLst>
+          </p:cNvPr>
+          <p:cNvPicPr>
+            <a:picLocks noChangeAspect="1"/>
+          </p:cNvPicPr>
+          <p:nvPr/>
+        </p:nvPicPr>
+        <p:blipFill>
+          <a:blip r:embed="rId2"/>
+          <a:stretch>
+            <a:fillRect/>
+          </a:stretch>
+        </p:blipFill>
+        <p:spPr>
+          <a:xfrm>
+            <a:off x="4671582" y="2811528"/>
+            <a:ext cx="7520418" cy="3365435"/>
+          </a:xfrm>
+          <a:prstGeom prst="rect">
+            <a:avLst/>
+          </a:prstGeom>
+        </p:spPr>
+      </p:pic>
     </p:spTree>
     <p:extLst>
       <p:ext uri="{BB962C8B-B14F-4D97-AF65-F5344CB8AC3E}">

</xml_diff>

<commit_message>
Testa pievienota pirma parslegsanas starp jautajumiem
</commit_message>
<xml_diff>
--- a/Bumerts_InformativaisMaterials.pptx
+++ b/Bumerts_InformativaisMaterials.pptx
@@ -4,6 +4,9 @@
   <p:sldMasterIdLst>
     <p:sldMasterId id="2147483648" r:id="rId1"/>
   </p:sldMasterIdLst>
+  <p:notesMasterIdLst>
+    <p:notesMasterId r:id="rId9"/>
+  </p:notesMasterIdLst>
   <p:sldIdLst>
     <p:sldId id="256" r:id="rId2"/>
     <p:sldId id="257" r:id="rId3"/>
@@ -118,6 +121,356 @@
 </p:presentation>
 </file>
 
+<file path=ppt/notesMasters/notesMaster1.xml><?xml version="1.0" encoding="utf-8"?>
+<p:notesMaster xmlns:a="http://schemas.openxmlformats.org/drawingml/2006/main" xmlns:r="http://schemas.openxmlformats.org/officeDocument/2006/relationships" xmlns:p="http://schemas.openxmlformats.org/presentationml/2006/main">
+  <p:cSld>
+    <p:bg>
+      <p:bgRef idx="1001">
+        <a:schemeClr val="bg1"/>
+      </p:bgRef>
+    </p:bg>
+    <p:spTree>
+      <p:nvGrpSpPr>
+        <p:cNvPr id="1" name=""/>
+        <p:cNvGrpSpPr/>
+        <p:nvPr/>
+      </p:nvGrpSpPr>
+      <p:grpSpPr>
+        <a:xfrm>
+          <a:off x="0" y="0"/>
+          <a:ext cx="0" cy="0"/>
+          <a:chOff x="0" y="0"/>
+          <a:chExt cx="0" cy="0"/>
+        </a:xfrm>
+      </p:grpSpPr>
+      <p:sp>
+        <p:nvSpPr>
+          <p:cNvPr id="2" name="Header Placeholder 1"/>
+          <p:cNvSpPr>
+            <a:spLocks noGrp="1"/>
+          </p:cNvSpPr>
+          <p:nvPr>
+            <p:ph type="hdr" sz="quarter"/>
+          </p:nvPr>
+        </p:nvSpPr>
+        <p:spPr>
+          <a:xfrm>
+            <a:off x="0" y="0"/>
+            <a:ext cx="2971800" cy="458788"/>
+          </a:xfrm>
+          <a:prstGeom prst="rect">
+            <a:avLst/>
+          </a:prstGeom>
+        </p:spPr>
+        <p:txBody>
+          <a:bodyPr vert="horz" lIns="91440" tIns="45720" rIns="91440" bIns="45720" rtlCol="0"/>
+          <a:lstStyle>
+            <a:lvl1pPr algn="l">
+              <a:defRPr sz="1200"/>
+            </a:lvl1pPr>
+          </a:lstStyle>
+          <a:p>
+            <a:endParaRPr lang="en-GB"/>
+          </a:p>
+        </p:txBody>
+      </p:sp>
+      <p:sp>
+        <p:nvSpPr>
+          <p:cNvPr id="3" name="Date Placeholder 2"/>
+          <p:cNvSpPr>
+            <a:spLocks noGrp="1"/>
+          </p:cNvSpPr>
+          <p:nvPr>
+            <p:ph type="dt" idx="1"/>
+          </p:nvPr>
+        </p:nvSpPr>
+        <p:spPr>
+          <a:xfrm>
+            <a:off x="3884613" y="0"/>
+            <a:ext cx="2971800" cy="458788"/>
+          </a:xfrm>
+          <a:prstGeom prst="rect">
+            <a:avLst/>
+          </a:prstGeom>
+        </p:spPr>
+        <p:txBody>
+          <a:bodyPr vert="horz" lIns="91440" tIns="45720" rIns="91440" bIns="45720" rtlCol="0"/>
+          <a:lstStyle>
+            <a:lvl1pPr algn="r">
+              <a:defRPr sz="1200"/>
+            </a:lvl1pPr>
+          </a:lstStyle>
+          <a:p>
+            <a:fld id="{C7A6D96B-9ACE-40C1-894A-13091C9ED700}" type="datetimeFigureOut">
+              <a:rPr lang="en-GB" smtClean="0"/>
+              <a:t>08/06/2023</a:t>
+            </a:fld>
+            <a:endParaRPr lang="en-GB"/>
+          </a:p>
+        </p:txBody>
+      </p:sp>
+      <p:sp>
+        <p:nvSpPr>
+          <p:cNvPr id="4" name="Slide Image Placeholder 3"/>
+          <p:cNvSpPr>
+            <a:spLocks noGrp="1" noRot="1" noChangeAspect="1"/>
+          </p:cNvSpPr>
+          <p:nvPr>
+            <p:ph type="sldImg" idx="2"/>
+          </p:nvPr>
+        </p:nvSpPr>
+        <p:spPr>
+          <a:xfrm>
+            <a:off x="685800" y="1143000"/>
+            <a:ext cx="5486400" cy="3086100"/>
+          </a:xfrm>
+          <a:prstGeom prst="rect">
+            <a:avLst/>
+          </a:prstGeom>
+          <a:noFill/>
+          <a:ln w="12700">
+            <a:solidFill>
+              <a:prstClr val="black"/>
+            </a:solidFill>
+          </a:ln>
+        </p:spPr>
+        <p:txBody>
+          <a:bodyPr vert="horz" lIns="91440" tIns="45720" rIns="91440" bIns="45720" rtlCol="0" anchor="ctr"/>
+          <a:lstStyle/>
+          <a:p>
+            <a:endParaRPr lang="en-GB"/>
+          </a:p>
+        </p:txBody>
+      </p:sp>
+      <p:sp>
+        <p:nvSpPr>
+          <p:cNvPr id="5" name="Notes Placeholder 4"/>
+          <p:cNvSpPr>
+            <a:spLocks noGrp="1"/>
+          </p:cNvSpPr>
+          <p:nvPr>
+            <p:ph type="body" sz="quarter" idx="3"/>
+          </p:nvPr>
+        </p:nvSpPr>
+        <p:spPr>
+          <a:xfrm>
+            <a:off x="685800" y="4400550"/>
+            <a:ext cx="5486400" cy="3600450"/>
+          </a:xfrm>
+          <a:prstGeom prst="rect">
+            <a:avLst/>
+          </a:prstGeom>
+        </p:spPr>
+        <p:txBody>
+          <a:bodyPr vert="horz" lIns="91440" tIns="45720" rIns="91440" bIns="45720" rtlCol="0"/>
+          <a:lstStyle/>
+          <a:p>
+            <a:pPr lvl="0"/>
+            <a:r>
+              <a:rPr lang="en-US"/>
+              <a:t>Click to edit Master text styles</a:t>
+            </a:r>
+          </a:p>
+          <a:p>
+            <a:pPr lvl="1"/>
+            <a:r>
+              <a:rPr lang="en-US"/>
+              <a:t>Second level</a:t>
+            </a:r>
+          </a:p>
+          <a:p>
+            <a:pPr lvl="2"/>
+            <a:r>
+              <a:rPr lang="en-US"/>
+              <a:t>Third level</a:t>
+            </a:r>
+          </a:p>
+          <a:p>
+            <a:pPr lvl="3"/>
+            <a:r>
+              <a:rPr lang="en-US"/>
+              <a:t>Fourth level</a:t>
+            </a:r>
+          </a:p>
+          <a:p>
+            <a:pPr lvl="4"/>
+            <a:r>
+              <a:rPr lang="en-US"/>
+              <a:t>Fifth level</a:t>
+            </a:r>
+            <a:endParaRPr lang="en-GB"/>
+          </a:p>
+        </p:txBody>
+      </p:sp>
+      <p:sp>
+        <p:nvSpPr>
+          <p:cNvPr id="6" name="Footer Placeholder 5"/>
+          <p:cNvSpPr>
+            <a:spLocks noGrp="1"/>
+          </p:cNvSpPr>
+          <p:nvPr>
+            <p:ph type="ftr" sz="quarter" idx="4"/>
+          </p:nvPr>
+        </p:nvSpPr>
+        <p:spPr>
+          <a:xfrm>
+            <a:off x="0" y="8685213"/>
+            <a:ext cx="2971800" cy="458787"/>
+          </a:xfrm>
+          <a:prstGeom prst="rect">
+            <a:avLst/>
+          </a:prstGeom>
+        </p:spPr>
+        <p:txBody>
+          <a:bodyPr vert="horz" lIns="91440" tIns="45720" rIns="91440" bIns="45720" rtlCol="0" anchor="b"/>
+          <a:lstStyle>
+            <a:lvl1pPr algn="l">
+              <a:defRPr sz="1200"/>
+            </a:lvl1pPr>
+          </a:lstStyle>
+          <a:p>
+            <a:endParaRPr lang="en-GB"/>
+          </a:p>
+        </p:txBody>
+      </p:sp>
+      <p:sp>
+        <p:nvSpPr>
+          <p:cNvPr id="7" name="Slide Number Placeholder 6"/>
+          <p:cNvSpPr>
+            <a:spLocks noGrp="1"/>
+          </p:cNvSpPr>
+          <p:nvPr>
+            <p:ph type="sldNum" sz="quarter" idx="5"/>
+          </p:nvPr>
+        </p:nvSpPr>
+        <p:spPr>
+          <a:xfrm>
+            <a:off x="3884613" y="8685213"/>
+            <a:ext cx="2971800" cy="458787"/>
+          </a:xfrm>
+          <a:prstGeom prst="rect">
+            <a:avLst/>
+          </a:prstGeom>
+        </p:spPr>
+        <p:txBody>
+          <a:bodyPr vert="horz" lIns="91440" tIns="45720" rIns="91440" bIns="45720" rtlCol="0" anchor="b"/>
+          <a:lstStyle>
+            <a:lvl1pPr algn="r">
+              <a:defRPr sz="1200"/>
+            </a:lvl1pPr>
+          </a:lstStyle>
+          <a:p>
+            <a:fld id="{FBAD8B26-CD44-4BB4-945F-E749085B921C}" type="slidenum">
+              <a:rPr lang="en-GB" smtClean="0"/>
+              <a:t>‹#›</a:t>
+            </a:fld>
+            <a:endParaRPr lang="en-GB"/>
+          </a:p>
+        </p:txBody>
+      </p:sp>
+    </p:spTree>
+    <p:extLst>
+      <p:ext uri="{BB962C8B-B14F-4D97-AF65-F5344CB8AC3E}">
+        <p14:creationId xmlns:p14="http://schemas.microsoft.com/office/powerpoint/2010/main" val="1793569406"/>
+      </p:ext>
+    </p:extLst>
+  </p:cSld>
+  <p:clrMap bg1="lt1" tx1="dk1" bg2="lt2" tx2="dk2" accent1="accent1" accent2="accent2" accent3="accent3" accent4="accent4" accent5="accent5" accent6="accent6" hlink="hlink" folHlink="folHlink"/>
+  <p:notesStyle>
+    <a:lvl1pPr marL="0" algn="l" defTabSz="914400" rtl="0" eaLnBrk="1" latinLnBrk="0" hangingPunct="1">
+      <a:defRPr sz="1200" kern="1200">
+        <a:solidFill>
+          <a:schemeClr val="tx1"/>
+        </a:solidFill>
+        <a:latin typeface="+mn-lt"/>
+        <a:ea typeface="+mn-ea"/>
+        <a:cs typeface="+mn-cs"/>
+      </a:defRPr>
+    </a:lvl1pPr>
+    <a:lvl2pPr marL="457200" algn="l" defTabSz="914400" rtl="0" eaLnBrk="1" latinLnBrk="0" hangingPunct="1">
+      <a:defRPr sz="1200" kern="1200">
+        <a:solidFill>
+          <a:schemeClr val="tx1"/>
+        </a:solidFill>
+        <a:latin typeface="+mn-lt"/>
+        <a:ea typeface="+mn-ea"/>
+        <a:cs typeface="+mn-cs"/>
+      </a:defRPr>
+    </a:lvl2pPr>
+    <a:lvl3pPr marL="914400" algn="l" defTabSz="914400" rtl="0" eaLnBrk="1" latinLnBrk="0" hangingPunct="1">
+      <a:defRPr sz="1200" kern="1200">
+        <a:solidFill>
+          <a:schemeClr val="tx1"/>
+        </a:solidFill>
+        <a:latin typeface="+mn-lt"/>
+        <a:ea typeface="+mn-ea"/>
+        <a:cs typeface="+mn-cs"/>
+      </a:defRPr>
+    </a:lvl3pPr>
+    <a:lvl4pPr marL="1371600" algn="l" defTabSz="914400" rtl="0" eaLnBrk="1" latinLnBrk="0" hangingPunct="1">
+      <a:defRPr sz="1200" kern="1200">
+        <a:solidFill>
+          <a:schemeClr val="tx1"/>
+        </a:solidFill>
+        <a:latin typeface="+mn-lt"/>
+        <a:ea typeface="+mn-ea"/>
+        <a:cs typeface="+mn-cs"/>
+      </a:defRPr>
+    </a:lvl4pPr>
+    <a:lvl5pPr marL="1828800" algn="l" defTabSz="914400" rtl="0" eaLnBrk="1" latinLnBrk="0" hangingPunct="1">
+      <a:defRPr sz="1200" kern="1200">
+        <a:solidFill>
+          <a:schemeClr val="tx1"/>
+        </a:solidFill>
+        <a:latin typeface="+mn-lt"/>
+        <a:ea typeface="+mn-ea"/>
+        <a:cs typeface="+mn-cs"/>
+      </a:defRPr>
+    </a:lvl5pPr>
+    <a:lvl6pPr marL="2286000" algn="l" defTabSz="914400" rtl="0" eaLnBrk="1" latinLnBrk="0" hangingPunct="1">
+      <a:defRPr sz="1200" kern="1200">
+        <a:solidFill>
+          <a:schemeClr val="tx1"/>
+        </a:solidFill>
+        <a:latin typeface="+mn-lt"/>
+        <a:ea typeface="+mn-ea"/>
+        <a:cs typeface="+mn-cs"/>
+      </a:defRPr>
+    </a:lvl6pPr>
+    <a:lvl7pPr marL="2743200" algn="l" defTabSz="914400" rtl="0" eaLnBrk="1" latinLnBrk="0" hangingPunct="1">
+      <a:defRPr sz="1200" kern="1200">
+        <a:solidFill>
+          <a:schemeClr val="tx1"/>
+        </a:solidFill>
+        <a:latin typeface="+mn-lt"/>
+        <a:ea typeface="+mn-ea"/>
+        <a:cs typeface="+mn-cs"/>
+      </a:defRPr>
+    </a:lvl7pPr>
+    <a:lvl8pPr marL="3200400" algn="l" defTabSz="914400" rtl="0" eaLnBrk="1" latinLnBrk="0" hangingPunct="1">
+      <a:defRPr sz="1200" kern="1200">
+        <a:solidFill>
+          <a:schemeClr val="tx1"/>
+        </a:solidFill>
+        <a:latin typeface="+mn-lt"/>
+        <a:ea typeface="+mn-ea"/>
+        <a:cs typeface="+mn-cs"/>
+      </a:defRPr>
+    </a:lvl8pPr>
+    <a:lvl9pPr marL="3657600" algn="l" defTabSz="914400" rtl="0" eaLnBrk="1" latinLnBrk="0" hangingPunct="1">
+      <a:defRPr sz="1200" kern="1200">
+        <a:solidFill>
+          <a:schemeClr val="tx1"/>
+        </a:solidFill>
+        <a:latin typeface="+mn-lt"/>
+        <a:ea typeface="+mn-ea"/>
+        <a:cs typeface="+mn-cs"/>
+      </a:defRPr>
+    </a:lvl9pPr>
+  </p:notesStyle>
+</p:notesMaster>
+</file>
+
 <file path=ppt/slideLayouts/slideLayout1.xml><?xml version="1.0" encoding="utf-8"?>
 <p:sldLayout xmlns:a="http://schemas.openxmlformats.org/drawingml/2006/main" xmlns:r="http://schemas.openxmlformats.org/officeDocument/2006/relationships" xmlns:p="http://schemas.openxmlformats.org/presentationml/2006/main" type="title" preserve="1">
   <p:cSld name="Title Slide">
@@ -267,7 +620,7 @@
           <a:p>
             <a:fld id="{EFCC5841-8728-46E2-B4B4-E3ECA7988A69}" type="datetimeFigureOut">
               <a:rPr lang="en-GB" smtClean="0"/>
-              <a:t>06/06/2023</a:t>
+              <a:t>08/06/2023</a:t>
             </a:fld>
             <a:endParaRPr lang="en-GB"/>
           </a:p>
@@ -467,7 +820,7 @@
           <a:p>
             <a:fld id="{EFCC5841-8728-46E2-B4B4-E3ECA7988A69}" type="datetimeFigureOut">
               <a:rPr lang="en-GB" smtClean="0"/>
-              <a:t>06/06/2023</a:t>
+              <a:t>08/06/2023</a:t>
             </a:fld>
             <a:endParaRPr lang="en-GB"/>
           </a:p>
@@ -677,7 +1030,7 @@
           <a:p>
             <a:fld id="{EFCC5841-8728-46E2-B4B4-E3ECA7988A69}" type="datetimeFigureOut">
               <a:rPr lang="en-GB" smtClean="0"/>
-              <a:t>06/06/2023</a:t>
+              <a:t>08/06/2023</a:t>
             </a:fld>
             <a:endParaRPr lang="en-GB"/>
           </a:p>
@@ -877,7 +1230,7 @@
           <a:p>
             <a:fld id="{EFCC5841-8728-46E2-B4B4-E3ECA7988A69}" type="datetimeFigureOut">
               <a:rPr lang="en-GB" smtClean="0"/>
-              <a:t>06/06/2023</a:t>
+              <a:t>08/06/2023</a:t>
             </a:fld>
             <a:endParaRPr lang="en-GB"/>
           </a:p>
@@ -1153,7 +1506,7 @@
           <a:p>
             <a:fld id="{EFCC5841-8728-46E2-B4B4-E3ECA7988A69}" type="datetimeFigureOut">
               <a:rPr lang="en-GB" smtClean="0"/>
-              <a:t>06/06/2023</a:t>
+              <a:t>08/06/2023</a:t>
             </a:fld>
             <a:endParaRPr lang="en-GB"/>
           </a:p>
@@ -1421,7 +1774,7 @@
           <a:p>
             <a:fld id="{EFCC5841-8728-46E2-B4B4-E3ECA7988A69}" type="datetimeFigureOut">
               <a:rPr lang="en-GB" smtClean="0"/>
-              <a:t>06/06/2023</a:t>
+              <a:t>08/06/2023</a:t>
             </a:fld>
             <a:endParaRPr lang="en-GB"/>
           </a:p>
@@ -1836,7 +2189,7 @@
           <a:p>
             <a:fld id="{EFCC5841-8728-46E2-B4B4-E3ECA7988A69}" type="datetimeFigureOut">
               <a:rPr lang="en-GB" smtClean="0"/>
-              <a:t>06/06/2023</a:t>
+              <a:t>08/06/2023</a:t>
             </a:fld>
             <a:endParaRPr lang="en-GB"/>
           </a:p>
@@ -1978,7 +2331,7 @@
           <a:p>
             <a:fld id="{EFCC5841-8728-46E2-B4B4-E3ECA7988A69}" type="datetimeFigureOut">
               <a:rPr lang="en-GB" smtClean="0"/>
-              <a:t>06/06/2023</a:t>
+              <a:t>08/06/2023</a:t>
             </a:fld>
             <a:endParaRPr lang="en-GB"/>
           </a:p>
@@ -2091,7 +2444,7 @@
           <a:p>
             <a:fld id="{EFCC5841-8728-46E2-B4B4-E3ECA7988A69}" type="datetimeFigureOut">
               <a:rPr lang="en-GB" smtClean="0"/>
-              <a:t>06/06/2023</a:t>
+              <a:t>08/06/2023</a:t>
             </a:fld>
             <a:endParaRPr lang="en-GB"/>
           </a:p>
@@ -2404,7 +2757,7 @@
           <a:p>
             <a:fld id="{EFCC5841-8728-46E2-B4B4-E3ECA7988A69}" type="datetimeFigureOut">
               <a:rPr lang="en-GB" smtClean="0"/>
-              <a:t>06/06/2023</a:t>
+              <a:t>08/06/2023</a:t>
             </a:fld>
             <a:endParaRPr lang="en-GB"/>
           </a:p>
@@ -2693,7 +3046,7 @@
           <a:p>
             <a:fld id="{EFCC5841-8728-46E2-B4B4-E3ECA7988A69}" type="datetimeFigureOut">
               <a:rPr lang="en-GB" smtClean="0"/>
-              <a:t>06/06/2023</a:t>
+              <a:t>08/06/2023</a:t>
             </a:fld>
             <a:endParaRPr lang="en-GB"/>
           </a:p>
@@ -2936,7 +3289,7 @@
           <a:p>
             <a:fld id="{EFCC5841-8728-46E2-B4B4-E3ECA7988A69}" type="datetimeFigureOut">
               <a:rPr lang="en-GB" smtClean="0"/>
-              <a:t>06/06/2023</a:t>
+              <a:t>08/06/2023</a:t>
             </a:fld>
             <a:endParaRPr lang="en-GB"/>
           </a:p>
@@ -3371,12 +3724,14 @@
         </p:nvSpPr>
         <p:spPr/>
         <p:txBody>
-          <a:bodyPr anchor="ctr"/>
+          <a:bodyPr anchor="ctr">
+            <a:normAutofit fontScale="90000"/>
+          </a:bodyPr>
           <a:lstStyle/>
           <a:p>
             <a:r>
               <a:rPr lang="lv-LV" dirty="0"/>
-              <a:t>Mainīgie,datu tipi</a:t>
+              <a:t>Mainīgie,datu tipi,pamtadarbības valodā Java</a:t>
             </a:r>
             <a:endParaRPr lang="en-GB" dirty="0"/>
           </a:p>
@@ -3507,7 +3862,7 @@
         </p:nvSpPr>
         <p:spPr>
           <a:xfrm>
-            <a:off x="838200" y="1825625"/>
+            <a:off x="838200" y="1739090"/>
             <a:ext cx="4732283" cy="3692306"/>
           </a:xfrm>
         </p:spPr>
@@ -3597,9 +3952,18 @@
             </a:pPr>
             <a:r>
               <a:rPr lang="lv-LV" sz="2800" dirty="0">
+                <a:solidFill>
+                  <a:srgbClr val="C00000"/>
+                </a:solidFill>
                 <a:latin typeface="Söhne"/>
               </a:rPr>
-              <a:t>Maksimāla </a:t>
+              <a:t>Maksimāla</a:t>
+            </a:r>
+            <a:r>
+              <a:rPr lang="lv-LV" sz="2800" dirty="0">
+                <a:latin typeface="Söhne"/>
+              </a:rPr>
+              <a:t> </a:t>
             </a:r>
             <a:r>
               <a:rPr lang="lv-LV" sz="2800" dirty="0">
@@ -3637,9 +4001,18 @@
             </a:pPr>
             <a:r>
               <a:rPr lang="lv-LV" sz="2800" dirty="0">
+                <a:solidFill>
+                  <a:srgbClr val="C00000"/>
+                </a:solidFill>
                 <a:latin typeface="Söhne"/>
               </a:rPr>
-              <a:t>Mazākā </a:t>
+              <a:t>Mazākā</a:t>
+            </a:r>
+            <a:r>
+              <a:rPr lang="lv-LV" sz="2800" dirty="0">
+                <a:latin typeface="Söhne"/>
+              </a:rPr>
+              <a:t> </a:t>
             </a:r>
             <a:r>
               <a:rPr lang="lv-LV" sz="2800" dirty="0">
@@ -3848,6 +4221,66 @@
           </a:prstGeom>
         </p:spPr>
       </p:pic>
+      <p:sp>
+        <p:nvSpPr>
+          <p:cNvPr id="4" name="TextBox 3">
+            <a:extLst>
+              <a:ext uri="{FF2B5EF4-FFF2-40B4-BE49-F238E27FC236}">
+                <a16:creationId xmlns:a16="http://schemas.microsoft.com/office/drawing/2014/main" id="{DCAD0F99-E758-13C1-0FFF-7739A1901DE7}"/>
+              </a:ext>
+            </a:extLst>
+          </p:cNvPr>
+          <p:cNvSpPr txBox="1"/>
+          <p:nvPr/>
+        </p:nvSpPr>
+        <p:spPr>
+          <a:xfrm>
+            <a:off x="5952154" y="5141893"/>
+            <a:ext cx="5903976" cy="954107"/>
+          </a:xfrm>
+          <a:prstGeom prst="rect">
+            <a:avLst/>
+          </a:prstGeom>
+          <a:noFill/>
+        </p:spPr>
+        <p:txBody>
+          <a:bodyPr wrap="square" rtlCol="0">
+            <a:spAutoFit/>
+          </a:bodyPr>
+          <a:lstStyle/>
+          <a:p>
+            <a:r>
+              <a:rPr lang="lv-LV" sz="2800" dirty="0"/>
+              <a:t>Arī </a:t>
+            </a:r>
+            <a:r>
+              <a:rPr lang="lv-LV" sz="2800" dirty="0">
+                <a:solidFill>
+                  <a:srgbClr val="C00000"/>
+                </a:solidFill>
+              </a:rPr>
+              <a:t>veseli skaitļi</a:t>
+            </a:r>
+            <a:r>
+              <a:rPr lang="lv-LV" sz="2800" dirty="0"/>
+              <a:t> tiek izvadīti ar kā </a:t>
+            </a:r>
+            <a:r>
+              <a:rPr lang="lv-LV" sz="2800" dirty="0">
+                <a:solidFill>
+                  <a:srgbClr val="C00000"/>
+                </a:solidFill>
+              </a:rPr>
+              <a:t>decimāldaļas</a:t>
+            </a:r>
+            <a:endParaRPr lang="en-GB" sz="2800" dirty="0">
+              <a:solidFill>
+                <a:srgbClr val="C00000"/>
+              </a:solidFill>
+            </a:endParaRPr>
+          </a:p>
+        </p:txBody>
+      </p:sp>
     </p:spTree>
     <p:extLst>
       <p:ext uri="{BB962C8B-B14F-4D97-AF65-F5344CB8AC3E}">
@@ -3959,7 +4392,31 @@
             </a:pPr>
             <a:r>
               <a:rPr lang="lv-LV" dirty="0"/>
-              <a:t>«patiesi»(true),»aplami»(false).</a:t>
+              <a:t>«patiesi»(</a:t>
+            </a:r>
+            <a:r>
+              <a:rPr lang="lv-LV" dirty="0">
+                <a:solidFill>
+                  <a:srgbClr val="7030A0"/>
+                </a:solidFill>
+              </a:rPr>
+              <a:t>true</a:t>
+            </a:r>
+            <a:r>
+              <a:rPr lang="lv-LV" dirty="0"/>
+              <a:t>),»aplami»(</a:t>
+            </a:r>
+            <a:r>
+              <a:rPr lang="lv-LV" dirty="0">
+                <a:solidFill>
+                  <a:srgbClr val="7030A0"/>
+                </a:solidFill>
+              </a:rPr>
+              <a:t>false</a:t>
+            </a:r>
+            <a:r>
+              <a:rPr lang="lv-LV" dirty="0"/>
+              <a:t>).</a:t>
             </a:r>
             <a:endParaRPr lang="en-GB" dirty="0"/>
           </a:p>
@@ -4121,6 +4578,50 @@
           </a:prstGeom>
         </p:spPr>
       </p:pic>
+      <p:sp>
+        <p:nvSpPr>
+          <p:cNvPr id="4" name="TextBox 3">
+            <a:extLst>
+              <a:ext uri="{FF2B5EF4-FFF2-40B4-BE49-F238E27FC236}">
+                <a16:creationId xmlns:a16="http://schemas.microsoft.com/office/drawing/2014/main" id="{8F4A5C22-4677-8CAD-7759-DAFABB001E5B}"/>
+              </a:ext>
+            </a:extLst>
+          </p:cNvPr>
+          <p:cNvSpPr txBox="1"/>
+          <p:nvPr/>
+        </p:nvSpPr>
+        <p:spPr>
+          <a:xfrm>
+            <a:off x="838200" y="3476458"/>
+            <a:ext cx="3833382" cy="954107"/>
+          </a:xfrm>
+          <a:prstGeom prst="rect">
+            <a:avLst/>
+          </a:prstGeom>
+          <a:noFill/>
+        </p:spPr>
+        <p:txBody>
+          <a:bodyPr wrap="square" rtlCol="0">
+            <a:spAutoFit/>
+          </a:bodyPr>
+          <a:lstStyle/>
+          <a:p>
+            <a:r>
+              <a:rPr lang="lv-LV" sz="2800" dirty="0">
+                <a:solidFill>
+                  <a:srgbClr val="C00000"/>
+                </a:solidFill>
+              </a:rPr>
+              <a:t>Pieskirot char vertību to ievieto starp ‘ ’ iekavām</a:t>
+            </a:r>
+            <a:endParaRPr lang="en-GB" sz="2800" dirty="0">
+              <a:solidFill>
+                <a:srgbClr val="C00000"/>
+              </a:solidFill>
+            </a:endParaRPr>
+          </a:p>
+        </p:txBody>
+      </p:sp>
     </p:spTree>
     <p:extLst>
       <p:ext uri="{BB962C8B-B14F-4D97-AF65-F5344CB8AC3E}">
@@ -4217,6 +4718,80 @@
           </a:p>
         </p:txBody>
       </p:sp>
+      <p:pic>
+        <p:nvPicPr>
+          <p:cNvPr id="5" name="Picture 4">
+            <a:extLst>
+              <a:ext uri="{FF2B5EF4-FFF2-40B4-BE49-F238E27FC236}">
+                <a16:creationId xmlns:a16="http://schemas.microsoft.com/office/drawing/2014/main" id="{3C65D6CD-0062-3103-197B-51013286E8EF}"/>
+              </a:ext>
+            </a:extLst>
+          </p:cNvPr>
+          <p:cNvPicPr>
+            <a:picLocks noChangeAspect="1"/>
+          </p:cNvPicPr>
+          <p:nvPr/>
+        </p:nvPicPr>
+        <p:blipFill>
+          <a:blip r:embed="rId2"/>
+          <a:stretch>
+            <a:fillRect/>
+          </a:stretch>
+        </p:blipFill>
+        <p:spPr>
+          <a:xfrm>
+            <a:off x="5337196" y="1386181"/>
+            <a:ext cx="5421391" cy="4829676"/>
+          </a:xfrm>
+          <a:prstGeom prst="rect">
+            <a:avLst/>
+          </a:prstGeom>
+        </p:spPr>
+      </p:pic>
+      <p:sp>
+        <p:nvSpPr>
+          <p:cNvPr id="6" name="TextBox 5">
+            <a:extLst>
+              <a:ext uri="{FF2B5EF4-FFF2-40B4-BE49-F238E27FC236}">
+                <a16:creationId xmlns:a16="http://schemas.microsoft.com/office/drawing/2014/main" id="{84CA60E9-8010-7BAC-144B-A3150ECBFA5C}"/>
+              </a:ext>
+            </a:extLst>
+          </p:cNvPr>
+          <p:cNvSpPr txBox="1"/>
+          <p:nvPr/>
+        </p:nvSpPr>
+        <p:spPr>
+          <a:xfrm>
+            <a:off x="838200" y="3524240"/>
+            <a:ext cx="4383024" cy="954107"/>
+          </a:xfrm>
+          <a:prstGeom prst="rect">
+            <a:avLst/>
+          </a:prstGeom>
+          <a:noFill/>
+        </p:spPr>
+        <p:txBody>
+          <a:bodyPr wrap="square" rtlCol="0">
+            <a:spAutoFit/>
+          </a:bodyPr>
+          <a:lstStyle/>
+          <a:p>
+            <a:r>
+              <a:rPr lang="lv-LV" sz="2800" dirty="0">
+                <a:solidFill>
+                  <a:srgbClr val="C00000"/>
+                </a:solidFill>
+              </a:rPr>
+              <a:t>Atceries ievietot String virknes vērtību starp « »!</a:t>
+            </a:r>
+            <a:endParaRPr lang="en-GB" sz="2800" dirty="0">
+              <a:solidFill>
+                <a:srgbClr val="C00000"/>
+              </a:solidFill>
+            </a:endParaRPr>
+          </a:p>
+        </p:txBody>
+      </p:sp>
     </p:spTree>
     <p:extLst>
       <p:ext uri="{BB962C8B-B14F-4D97-AF65-F5344CB8AC3E}">
@@ -4295,11 +4870,13 @@
         <p:spPr>
           <a:xfrm>
             <a:off x="838200" y="1825625"/>
-            <a:ext cx="3302876" cy="4351338"/>
+            <a:ext cx="3302876" cy="1603375"/>
           </a:xfrm>
         </p:spPr>
         <p:txBody>
-          <a:bodyPr/>
+          <a:bodyPr>
+            <a:normAutofit lnSpcReduction="10000"/>
+          </a:bodyPr>
           <a:lstStyle/>
           <a:p>
             <a:pPr marL="0" indent="0">
@@ -4307,9 +4884,82 @@
             </a:pPr>
             <a:r>
               <a:rPr lang="lv-LV" dirty="0"/>
-              <a:t>Mainīgais ļauj glabāt vairākus elementus vienā mainīgajā.</a:t>
-            </a:r>
-            <a:endParaRPr lang="en-GB" dirty="0"/>
+              <a:t>Mainīgais ļauj glabāt vairākus elementus vienā mainīgajā,kā arī tos apstrādāt.</a:t>
+            </a:r>
+          </a:p>
+        </p:txBody>
+      </p:sp>
+      <p:pic>
+        <p:nvPicPr>
+          <p:cNvPr id="5" name="Picture 4">
+            <a:extLst>
+              <a:ext uri="{FF2B5EF4-FFF2-40B4-BE49-F238E27FC236}">
+                <a16:creationId xmlns:a16="http://schemas.microsoft.com/office/drawing/2014/main" id="{8009B4B2-01D1-3F13-ED6F-3FD68B8F50E8}"/>
+              </a:ext>
+            </a:extLst>
+          </p:cNvPr>
+          <p:cNvPicPr>
+            <a:picLocks noChangeAspect="1"/>
+          </p:cNvPicPr>
+          <p:nvPr/>
+        </p:nvPicPr>
+        <p:blipFill>
+          <a:blip r:embed="rId2"/>
+          <a:stretch>
+            <a:fillRect/>
+          </a:stretch>
+        </p:blipFill>
+        <p:spPr>
+          <a:xfrm>
+            <a:off x="5324475" y="1690688"/>
+            <a:ext cx="6029325" cy="3743325"/>
+          </a:xfrm>
+          <a:prstGeom prst="rect">
+            <a:avLst/>
+          </a:prstGeom>
+        </p:spPr>
+      </p:pic>
+      <p:sp>
+        <p:nvSpPr>
+          <p:cNvPr id="6" name="TextBox 5">
+            <a:extLst>
+              <a:ext uri="{FF2B5EF4-FFF2-40B4-BE49-F238E27FC236}">
+                <a16:creationId xmlns:a16="http://schemas.microsoft.com/office/drawing/2014/main" id="{E6CC2582-9BF3-9669-18F1-259AD69E795F}"/>
+              </a:ext>
+            </a:extLst>
+          </p:cNvPr>
+          <p:cNvSpPr txBox="1"/>
+          <p:nvPr/>
+        </p:nvSpPr>
+        <p:spPr>
+          <a:xfrm>
+            <a:off x="838200" y="3429000"/>
+            <a:ext cx="3483005" cy="954107"/>
+          </a:xfrm>
+          <a:prstGeom prst="rect">
+            <a:avLst/>
+          </a:prstGeom>
+          <a:noFill/>
+        </p:spPr>
+        <p:txBody>
+          <a:bodyPr wrap="square" rtlCol="0">
+            <a:spAutoFit/>
+          </a:bodyPr>
+          <a:lstStyle/>
+          <a:p>
+            <a:r>
+              <a:rPr lang="lv-LV" sz="2800" dirty="0">
+                <a:solidFill>
+                  <a:srgbClr val="C00000"/>
+                </a:solidFill>
+              </a:rPr>
+              <a:t>Masīva indekss sākas skaitīties no 0!</a:t>
+            </a:r>
+            <a:endParaRPr lang="en-GB" sz="2800" dirty="0">
+              <a:solidFill>
+                <a:srgbClr val="C00000"/>
+              </a:solidFill>
+            </a:endParaRPr>
           </a:p>
         </p:txBody>
       </p:sp>
@@ -4619,4 +5269,299 @@
     </a:ext>
   </a:extLst>
 </a:theme>
+</file>
+
+<file path=ppt/theme/theme2.xml><?xml version="1.0" encoding="utf-8"?>
+<a:theme xmlns:a="http://schemas.openxmlformats.org/drawingml/2006/main" name="Office Theme">
+  <a:themeElements>
+    <a:clrScheme name="Office">
+      <a:dk1>
+        <a:sysClr val="windowText" lastClr="000000"/>
+      </a:dk1>
+      <a:lt1>
+        <a:sysClr val="window" lastClr="FFFFFF"/>
+      </a:lt1>
+      <a:dk2>
+        <a:srgbClr val="44546A"/>
+      </a:dk2>
+      <a:lt2>
+        <a:srgbClr val="E7E6E6"/>
+      </a:lt2>
+      <a:accent1>
+        <a:srgbClr val="4472C4"/>
+      </a:accent1>
+      <a:accent2>
+        <a:srgbClr val="ED7D31"/>
+      </a:accent2>
+      <a:accent3>
+        <a:srgbClr val="A5A5A5"/>
+      </a:accent3>
+      <a:accent4>
+        <a:srgbClr val="FFC000"/>
+      </a:accent4>
+      <a:accent5>
+        <a:srgbClr val="5B9BD5"/>
+      </a:accent5>
+      <a:accent6>
+        <a:srgbClr val="70AD47"/>
+      </a:accent6>
+      <a:hlink>
+        <a:srgbClr val="0563C1"/>
+      </a:hlink>
+      <a:folHlink>
+        <a:srgbClr val="954F72"/>
+      </a:folHlink>
+    </a:clrScheme>
+    <a:fontScheme name="Office">
+      <a:majorFont>
+        <a:latin typeface="Calibri Light" panose="020F0302020204030204"/>
+        <a:ea typeface=""/>
+        <a:cs typeface=""/>
+        <a:font script="Jpan" typeface="游ゴシック Light"/>
+        <a:font script="Hang" typeface="맑은 고딕"/>
+        <a:font script="Hans" typeface="等线 Light"/>
+        <a:font script="Hant" typeface="新細明體"/>
+        <a:font script="Arab" typeface="Times New Roman"/>
+        <a:font script="Hebr" typeface="Times New Roman"/>
+        <a:font script="Thai" typeface="Angsana New"/>
+        <a:font script="Ethi" typeface="Nyala"/>
+        <a:font script="Beng" typeface="Vrinda"/>
+        <a:font script="Gujr" typeface="Shruti"/>
+        <a:font script="Khmr" typeface="MoolBoran"/>
+        <a:font script="Knda" typeface="Tunga"/>
+        <a:font script="Guru" typeface="Raavi"/>
+        <a:font script="Cans" typeface="Euphemia"/>
+        <a:font script="Cher" typeface="Plantagenet Cherokee"/>
+        <a:font script="Yiii" typeface="Microsoft Yi Baiti"/>
+        <a:font script="Tibt" typeface="Microsoft Himalaya"/>
+        <a:font script="Thaa" typeface="MV Boli"/>
+        <a:font script="Deva" typeface="Mangal"/>
+        <a:font script="Telu" typeface="Gautami"/>
+        <a:font script="Taml" typeface="Latha"/>
+        <a:font script="Syrc" typeface="Estrangelo Edessa"/>
+        <a:font script="Orya" typeface="Kalinga"/>
+        <a:font script="Mlym" typeface="Kartika"/>
+        <a:font script="Laoo" typeface="DokChampa"/>
+        <a:font script="Sinh" typeface="Iskoola Pota"/>
+        <a:font script="Mong" typeface="Mongolian Baiti"/>
+        <a:font script="Viet" typeface="Times New Roman"/>
+        <a:font script="Uigh" typeface="Microsoft Uighur"/>
+        <a:font script="Geor" typeface="Sylfaen"/>
+        <a:font script="Armn" typeface="Arial"/>
+        <a:font script="Bugi" typeface="Leelawadee UI"/>
+        <a:font script="Bopo" typeface="Microsoft JhengHei"/>
+        <a:font script="Java" typeface="Javanese Text"/>
+        <a:font script="Lisu" typeface="Segoe UI"/>
+        <a:font script="Mymr" typeface="Myanmar Text"/>
+        <a:font script="Nkoo" typeface="Ebrima"/>
+        <a:font script="Olck" typeface="Nirmala UI"/>
+        <a:font script="Osma" typeface="Ebrima"/>
+        <a:font script="Phag" typeface="Phagspa"/>
+        <a:font script="Syrn" typeface="Estrangelo Edessa"/>
+        <a:font script="Syrj" typeface="Estrangelo Edessa"/>
+        <a:font script="Syre" typeface="Estrangelo Edessa"/>
+        <a:font script="Sora" typeface="Nirmala UI"/>
+        <a:font script="Tale" typeface="Microsoft Tai Le"/>
+        <a:font script="Talu" typeface="Microsoft New Tai Lue"/>
+        <a:font script="Tfng" typeface="Ebrima"/>
+      </a:majorFont>
+      <a:minorFont>
+        <a:latin typeface="Calibri" panose="020F0502020204030204"/>
+        <a:ea typeface=""/>
+        <a:cs typeface=""/>
+        <a:font script="Jpan" typeface="游ゴシック"/>
+        <a:font script="Hang" typeface="맑은 고딕"/>
+        <a:font script="Hans" typeface="等线"/>
+        <a:font script="Hant" typeface="新細明體"/>
+        <a:font script="Arab" typeface="Arial"/>
+        <a:font script="Hebr" typeface="Arial"/>
+        <a:font script="Thai" typeface="Cordia New"/>
+        <a:font script="Ethi" typeface="Nyala"/>
+        <a:font script="Beng" typeface="Vrinda"/>
+        <a:font script="Gujr" typeface="Shruti"/>
+        <a:font script="Khmr" typeface="DaunPenh"/>
+        <a:font script="Knda" typeface="Tunga"/>
+        <a:font script="Guru" typeface="Raavi"/>
+        <a:font script="Cans" typeface="Euphemia"/>
+        <a:font script="Cher" typeface="Plantagenet Cherokee"/>
+        <a:font script="Yiii" typeface="Microsoft Yi Baiti"/>
+        <a:font script="Tibt" typeface="Microsoft Himalaya"/>
+        <a:font script="Thaa" typeface="MV Boli"/>
+        <a:font script="Deva" typeface="Mangal"/>
+        <a:font script="Telu" typeface="Gautami"/>
+        <a:font script="Taml" typeface="Latha"/>
+        <a:font script="Syrc" typeface="Estrangelo Edessa"/>
+        <a:font script="Orya" typeface="Kalinga"/>
+        <a:font script="Mlym" typeface="Kartika"/>
+        <a:font script="Laoo" typeface="DokChampa"/>
+        <a:font script="Sinh" typeface="Iskoola Pota"/>
+        <a:font script="Mong" typeface="Mongolian Baiti"/>
+        <a:font script="Viet" typeface="Arial"/>
+        <a:font script="Uigh" typeface="Microsoft Uighur"/>
+        <a:font script="Geor" typeface="Sylfaen"/>
+        <a:font script="Armn" typeface="Arial"/>
+        <a:font script="Bugi" typeface="Leelawadee UI"/>
+        <a:font script="Bopo" typeface="Microsoft JhengHei"/>
+        <a:font script="Java" typeface="Javanese Text"/>
+        <a:font script="Lisu" typeface="Segoe UI"/>
+        <a:font script="Mymr" typeface="Myanmar Text"/>
+        <a:font script="Nkoo" typeface="Ebrima"/>
+        <a:font script="Olck" typeface="Nirmala UI"/>
+        <a:font script="Osma" typeface="Ebrima"/>
+        <a:font script="Phag" typeface="Phagspa"/>
+        <a:font script="Syrn" typeface="Estrangelo Edessa"/>
+        <a:font script="Syrj" typeface="Estrangelo Edessa"/>
+        <a:font script="Syre" typeface="Estrangelo Edessa"/>
+        <a:font script="Sora" typeface="Nirmala UI"/>
+        <a:font script="Tale" typeface="Microsoft Tai Le"/>
+        <a:font script="Talu" typeface="Microsoft New Tai Lue"/>
+        <a:font script="Tfng" typeface="Ebrima"/>
+      </a:minorFont>
+    </a:fontScheme>
+    <a:fmtScheme name="Office">
+      <a:fillStyleLst>
+        <a:solidFill>
+          <a:schemeClr val="phClr"/>
+        </a:solidFill>
+        <a:gradFill rotWithShape="1">
+          <a:gsLst>
+            <a:gs pos="0">
+              <a:schemeClr val="phClr">
+                <a:lumMod val="110000"/>
+                <a:satMod val="105000"/>
+                <a:tint val="67000"/>
+              </a:schemeClr>
+            </a:gs>
+            <a:gs pos="50000">
+              <a:schemeClr val="phClr">
+                <a:lumMod val="105000"/>
+                <a:satMod val="103000"/>
+                <a:tint val="73000"/>
+              </a:schemeClr>
+            </a:gs>
+            <a:gs pos="100000">
+              <a:schemeClr val="phClr">
+                <a:lumMod val="105000"/>
+                <a:satMod val="109000"/>
+                <a:tint val="81000"/>
+              </a:schemeClr>
+            </a:gs>
+          </a:gsLst>
+          <a:lin ang="5400000" scaled="0"/>
+        </a:gradFill>
+        <a:gradFill rotWithShape="1">
+          <a:gsLst>
+            <a:gs pos="0">
+              <a:schemeClr val="phClr">
+                <a:satMod val="103000"/>
+                <a:lumMod val="102000"/>
+                <a:tint val="94000"/>
+              </a:schemeClr>
+            </a:gs>
+            <a:gs pos="50000">
+              <a:schemeClr val="phClr">
+                <a:satMod val="110000"/>
+                <a:lumMod val="100000"/>
+                <a:shade val="100000"/>
+              </a:schemeClr>
+            </a:gs>
+            <a:gs pos="100000">
+              <a:schemeClr val="phClr">
+                <a:lumMod val="99000"/>
+                <a:satMod val="120000"/>
+                <a:shade val="78000"/>
+              </a:schemeClr>
+            </a:gs>
+          </a:gsLst>
+          <a:lin ang="5400000" scaled="0"/>
+        </a:gradFill>
+      </a:fillStyleLst>
+      <a:lnStyleLst>
+        <a:ln w="6350" cap="flat" cmpd="sng" algn="ctr">
+          <a:solidFill>
+            <a:schemeClr val="phClr"/>
+          </a:solidFill>
+          <a:prstDash val="solid"/>
+          <a:miter lim="800000"/>
+        </a:ln>
+        <a:ln w="12700" cap="flat" cmpd="sng" algn="ctr">
+          <a:solidFill>
+            <a:schemeClr val="phClr"/>
+          </a:solidFill>
+          <a:prstDash val="solid"/>
+          <a:miter lim="800000"/>
+        </a:ln>
+        <a:ln w="19050" cap="flat" cmpd="sng" algn="ctr">
+          <a:solidFill>
+            <a:schemeClr val="phClr"/>
+          </a:solidFill>
+          <a:prstDash val="solid"/>
+          <a:miter lim="800000"/>
+        </a:ln>
+      </a:lnStyleLst>
+      <a:effectStyleLst>
+        <a:effectStyle>
+          <a:effectLst/>
+        </a:effectStyle>
+        <a:effectStyle>
+          <a:effectLst/>
+        </a:effectStyle>
+        <a:effectStyle>
+          <a:effectLst>
+            <a:outerShdw blurRad="57150" dist="19050" dir="5400000" algn="ctr" rotWithShape="0">
+              <a:srgbClr val="000000">
+                <a:alpha val="63000"/>
+              </a:srgbClr>
+            </a:outerShdw>
+          </a:effectLst>
+        </a:effectStyle>
+      </a:effectStyleLst>
+      <a:bgFillStyleLst>
+        <a:solidFill>
+          <a:schemeClr val="phClr"/>
+        </a:solidFill>
+        <a:solidFill>
+          <a:schemeClr val="phClr">
+            <a:tint val="95000"/>
+            <a:satMod val="170000"/>
+          </a:schemeClr>
+        </a:solidFill>
+        <a:gradFill rotWithShape="1">
+          <a:gsLst>
+            <a:gs pos="0">
+              <a:schemeClr val="phClr">
+                <a:tint val="93000"/>
+                <a:satMod val="150000"/>
+                <a:shade val="98000"/>
+                <a:lumMod val="102000"/>
+              </a:schemeClr>
+            </a:gs>
+            <a:gs pos="50000">
+              <a:schemeClr val="phClr">
+                <a:tint val="98000"/>
+                <a:satMod val="130000"/>
+                <a:shade val="90000"/>
+                <a:lumMod val="103000"/>
+              </a:schemeClr>
+            </a:gs>
+            <a:gs pos="100000">
+              <a:schemeClr val="phClr">
+                <a:shade val="63000"/>
+                <a:satMod val="120000"/>
+              </a:schemeClr>
+            </a:gs>
+          </a:gsLst>
+          <a:lin ang="5400000" scaled="0"/>
+        </a:gradFill>
+      </a:bgFillStyleLst>
+    </a:fmtScheme>
+  </a:themeElements>
+  <a:objectDefaults/>
+  <a:extraClrSchemeLst/>
+  <a:extLst>
+    <a:ext uri="{05A4C25C-085E-4340-85A3-A5531E510DB2}">
+      <thm15:themeFamily xmlns:thm15="http://schemas.microsoft.com/office/thememl/2012/main" name="Office Theme" id="{62F939B6-93AF-4DB8-9C6B-D6C7DFDC589F}" vid="{4A3C46E8-61CC-4603-A589-7422A47A8E4A}"/>
+    </a:ext>
+  </a:extLst>
+</a:theme>
 </file>
</xml_diff>

<commit_message>
Pievienots 4. un 5. jautajuma funkcionalitāte
</commit_message>
<xml_diff>
--- a/Bumerts_InformativaisMaterials.pptx
+++ b/Bumerts_InformativaisMaterials.pptx
@@ -4187,6 +4187,15 @@
             <a:r>
               <a:rPr lang="lv-LV" dirty="0"/>
               <a:t>Realie skaitļi tiek izmantoti lai saglabātu skaitļus mainīga kurš sastāv no decimāldaļām(aiz komata).</a:t>
+            </a:r>
+          </a:p>
+          <a:p>
+            <a:pPr marL="0" indent="0">
+              <a:buNone/>
+            </a:pPr>
+            <a:r>
+              <a:rPr lang="lv-LV" dirty="0"/>
+              <a:t>Piemēram 2.9,2.1,1.0 utt.</a:t>
             </a:r>
           </a:p>
         </p:txBody>

</xml_diff>

<commit_message>
Korektu jautajumu ievietosana programma un sakta pareizo atbilzu skaitisana
</commit_message>
<xml_diff>
--- a/Bumerts_InformativaisMaterials.pptx
+++ b/Bumerts_InformativaisMaterials.pptx
@@ -203,7 +203,7 @@
           <a:p>
             <a:fld id="{C7A6D96B-9ACE-40C1-894A-13091C9ED700}" type="datetimeFigureOut">
               <a:rPr lang="en-GB" smtClean="0"/>
-              <a:t>08/06/2023</a:t>
+              <a:t>11/06/2023</a:t>
             </a:fld>
             <a:endParaRPr lang="en-GB"/>
           </a:p>
@@ -620,7 +620,7 @@
           <a:p>
             <a:fld id="{EFCC5841-8728-46E2-B4B4-E3ECA7988A69}" type="datetimeFigureOut">
               <a:rPr lang="en-GB" smtClean="0"/>
-              <a:t>08/06/2023</a:t>
+              <a:t>11/06/2023</a:t>
             </a:fld>
             <a:endParaRPr lang="en-GB"/>
           </a:p>
@@ -820,7 +820,7 @@
           <a:p>
             <a:fld id="{EFCC5841-8728-46E2-B4B4-E3ECA7988A69}" type="datetimeFigureOut">
               <a:rPr lang="en-GB" smtClean="0"/>
-              <a:t>08/06/2023</a:t>
+              <a:t>11/06/2023</a:t>
             </a:fld>
             <a:endParaRPr lang="en-GB"/>
           </a:p>
@@ -1030,7 +1030,7 @@
           <a:p>
             <a:fld id="{EFCC5841-8728-46E2-B4B4-E3ECA7988A69}" type="datetimeFigureOut">
               <a:rPr lang="en-GB" smtClean="0"/>
-              <a:t>08/06/2023</a:t>
+              <a:t>11/06/2023</a:t>
             </a:fld>
             <a:endParaRPr lang="en-GB"/>
           </a:p>
@@ -1230,7 +1230,7 @@
           <a:p>
             <a:fld id="{EFCC5841-8728-46E2-B4B4-E3ECA7988A69}" type="datetimeFigureOut">
               <a:rPr lang="en-GB" smtClean="0"/>
-              <a:t>08/06/2023</a:t>
+              <a:t>11/06/2023</a:t>
             </a:fld>
             <a:endParaRPr lang="en-GB"/>
           </a:p>
@@ -1506,7 +1506,7 @@
           <a:p>
             <a:fld id="{EFCC5841-8728-46E2-B4B4-E3ECA7988A69}" type="datetimeFigureOut">
               <a:rPr lang="en-GB" smtClean="0"/>
-              <a:t>08/06/2023</a:t>
+              <a:t>11/06/2023</a:t>
             </a:fld>
             <a:endParaRPr lang="en-GB"/>
           </a:p>
@@ -1774,7 +1774,7 @@
           <a:p>
             <a:fld id="{EFCC5841-8728-46E2-B4B4-E3ECA7988A69}" type="datetimeFigureOut">
               <a:rPr lang="en-GB" smtClean="0"/>
-              <a:t>08/06/2023</a:t>
+              <a:t>11/06/2023</a:t>
             </a:fld>
             <a:endParaRPr lang="en-GB"/>
           </a:p>
@@ -2189,7 +2189,7 @@
           <a:p>
             <a:fld id="{EFCC5841-8728-46E2-B4B4-E3ECA7988A69}" type="datetimeFigureOut">
               <a:rPr lang="en-GB" smtClean="0"/>
-              <a:t>08/06/2023</a:t>
+              <a:t>11/06/2023</a:t>
             </a:fld>
             <a:endParaRPr lang="en-GB"/>
           </a:p>
@@ -2331,7 +2331,7 @@
           <a:p>
             <a:fld id="{EFCC5841-8728-46E2-B4B4-E3ECA7988A69}" type="datetimeFigureOut">
               <a:rPr lang="en-GB" smtClean="0"/>
-              <a:t>08/06/2023</a:t>
+              <a:t>11/06/2023</a:t>
             </a:fld>
             <a:endParaRPr lang="en-GB"/>
           </a:p>
@@ -2444,7 +2444,7 @@
           <a:p>
             <a:fld id="{EFCC5841-8728-46E2-B4B4-E3ECA7988A69}" type="datetimeFigureOut">
               <a:rPr lang="en-GB" smtClean="0"/>
-              <a:t>08/06/2023</a:t>
+              <a:t>11/06/2023</a:t>
             </a:fld>
             <a:endParaRPr lang="en-GB"/>
           </a:p>
@@ -2757,7 +2757,7 @@
           <a:p>
             <a:fld id="{EFCC5841-8728-46E2-B4B4-E3ECA7988A69}" type="datetimeFigureOut">
               <a:rPr lang="en-GB" smtClean="0"/>
-              <a:t>08/06/2023</a:t>
+              <a:t>11/06/2023</a:t>
             </a:fld>
             <a:endParaRPr lang="en-GB"/>
           </a:p>
@@ -3046,7 +3046,7 @@
           <a:p>
             <a:fld id="{EFCC5841-8728-46E2-B4B4-E3ECA7988A69}" type="datetimeFigureOut">
               <a:rPr lang="en-GB" smtClean="0"/>
-              <a:t>08/06/2023</a:t>
+              <a:t>11/06/2023</a:t>
             </a:fld>
             <a:endParaRPr lang="en-GB"/>
           </a:p>
@@ -3289,7 +3289,7 @@
           <a:p>
             <a:fld id="{EFCC5841-8728-46E2-B4B4-E3ECA7988A69}" type="datetimeFigureOut">
               <a:rPr lang="en-GB" smtClean="0"/>
-              <a:t>08/06/2023</a:t>
+              <a:t>11/06/2023</a:t>
             </a:fld>
             <a:endParaRPr lang="en-GB"/>
           </a:p>

</xml_diff>